<commit_message>
ISIS-1801: adds new BookmarkUiService, and updates docs
</commit_message>
<xml_diff>
--- a/adocs/documentation/src/main/asciidoc/guides/rgsvc/images/reference-services/categories.pptx
+++ b/adocs/documentation/src/main/asciidoc/guides/rgsvc/images/reference-services/categories.pptx
@@ -104,7 +104,27 @@
       </a:defRPr>
     </a:lvl9pPr>
   </p:defaultTextStyle>
+  <p:extLst>
+    <p:ext uri="{EFAFB233-063F-42B5-8137-9DF3F51BA10A}">
+      <p15:sldGuideLst xmlns:p15="http://schemas.microsoft.com/office/powerpoint/2012/main">
+        <p15:guide id="1" orient="horz" pos="2160">
+          <p15:clr>
+            <a:srgbClr val="A4A3A4"/>
+          </p15:clr>
+        </p15:guide>
+        <p15:guide id="2" pos="2880">
+          <p15:clr>
+            <a:srgbClr val="A4A3A4"/>
+          </p15:clr>
+        </p15:guide>
+      </p15:sldGuideLst>
+    </p:ext>
+  </p:extLst>
 </p:presentation>
+</file>
+
+<file path=ppt/revisionInfo.xml><?xml version="1.0" encoding="utf-8"?>
+<p1510:revInfo xmlns:a="http://schemas.openxmlformats.org/drawingml/2006/main" xmlns:r="http://schemas.openxmlformats.org/officeDocument/2006/relationships" xmlns:p1510="http://schemas.microsoft.com/office/powerpoint/2015/10/main"/>
 </file>
 
 <file path=ppt/slideLayouts/slideLayout1.xml><?xml version="1.0" encoding="utf-8"?>
@@ -145,7 +165,7 @@
           <a:lstStyle/>
           <a:p>
             <a:r>
-              <a:rPr lang="en-US" smtClean="0"/>
+              <a:rPr lang="en-US"/>
               <a:t>Click to edit Master title style</a:t>
             </a:r>
             <a:endParaRPr lang="en-GB"/>
@@ -264,7 +284,7 @@
           </a:lstStyle>
           <a:p>
             <a:r>
-              <a:rPr lang="en-US" smtClean="0"/>
+              <a:rPr lang="en-US"/>
               <a:t>Click to edit Master subtitle style</a:t>
             </a:r>
             <a:endParaRPr lang="en-GB"/>
@@ -288,7 +308,7 @@
           <a:p>
             <a:fld id="{EA92691D-FF03-40D7-9ED0-9214EECCD472}" type="datetimeFigureOut">
               <a:rPr lang="en-GB" smtClean="0"/>
-              <a:t>14/03/2016</a:t>
+              <a:t>28/12/2017</a:t>
             </a:fld>
             <a:endParaRPr lang="en-GB"/>
           </a:p>
@@ -382,7 +402,7 @@
           <a:lstStyle/>
           <a:p>
             <a:r>
-              <a:rPr lang="en-US" smtClean="0"/>
+              <a:rPr lang="en-US"/>
               <a:t>Click to edit Master title style</a:t>
             </a:r>
             <a:endParaRPr lang="en-GB"/>
@@ -406,35 +426,35 @@
           <a:p>
             <a:pPr lvl="0"/>
             <a:r>
-              <a:rPr lang="en-US" smtClean="0"/>
+              <a:rPr lang="en-US"/>
               <a:t>Click to edit Master text styles</a:t>
             </a:r>
           </a:p>
           <a:p>
             <a:pPr lvl="1"/>
             <a:r>
-              <a:rPr lang="en-US" smtClean="0"/>
+              <a:rPr lang="en-US"/>
               <a:t>Second level</a:t>
             </a:r>
           </a:p>
           <a:p>
             <a:pPr lvl="2"/>
             <a:r>
-              <a:rPr lang="en-US" smtClean="0"/>
+              <a:rPr lang="en-US"/>
               <a:t>Third level</a:t>
             </a:r>
           </a:p>
           <a:p>
             <a:pPr lvl="3"/>
             <a:r>
-              <a:rPr lang="en-US" smtClean="0"/>
+              <a:rPr lang="en-US"/>
               <a:t>Fourth level</a:t>
             </a:r>
           </a:p>
           <a:p>
             <a:pPr lvl="4"/>
             <a:r>
-              <a:rPr lang="en-US" smtClean="0"/>
+              <a:rPr lang="en-US"/>
               <a:t>Fifth level</a:t>
             </a:r>
             <a:endParaRPr lang="en-GB"/>
@@ -458,7 +478,7 @@
           <a:p>
             <a:fld id="{EA92691D-FF03-40D7-9ED0-9214EECCD472}" type="datetimeFigureOut">
               <a:rPr lang="en-GB" smtClean="0"/>
-              <a:t>14/03/2016</a:t>
+              <a:t>28/12/2017</a:t>
             </a:fld>
             <a:endParaRPr lang="en-GB"/>
           </a:p>
@@ -557,7 +577,7 @@
           <a:lstStyle/>
           <a:p>
             <a:r>
-              <a:rPr lang="en-US" smtClean="0"/>
+              <a:rPr lang="en-US"/>
               <a:t>Click to edit Master title style</a:t>
             </a:r>
             <a:endParaRPr lang="en-GB"/>
@@ -586,35 +606,35 @@
           <a:p>
             <a:pPr lvl="0"/>
             <a:r>
-              <a:rPr lang="en-US" smtClean="0"/>
+              <a:rPr lang="en-US"/>
               <a:t>Click to edit Master text styles</a:t>
             </a:r>
           </a:p>
           <a:p>
             <a:pPr lvl="1"/>
             <a:r>
-              <a:rPr lang="en-US" smtClean="0"/>
+              <a:rPr lang="en-US"/>
               <a:t>Second level</a:t>
             </a:r>
           </a:p>
           <a:p>
             <a:pPr lvl="2"/>
             <a:r>
-              <a:rPr lang="en-US" smtClean="0"/>
+              <a:rPr lang="en-US"/>
               <a:t>Third level</a:t>
             </a:r>
           </a:p>
           <a:p>
             <a:pPr lvl="3"/>
             <a:r>
-              <a:rPr lang="en-US" smtClean="0"/>
+              <a:rPr lang="en-US"/>
               <a:t>Fourth level</a:t>
             </a:r>
           </a:p>
           <a:p>
             <a:pPr lvl="4"/>
             <a:r>
-              <a:rPr lang="en-US" smtClean="0"/>
+              <a:rPr lang="en-US"/>
               <a:t>Fifth level</a:t>
             </a:r>
             <a:endParaRPr lang="en-GB"/>
@@ -638,7 +658,7 @@
           <a:p>
             <a:fld id="{EA92691D-FF03-40D7-9ED0-9214EECCD472}" type="datetimeFigureOut">
               <a:rPr lang="en-GB" smtClean="0"/>
-              <a:t>14/03/2016</a:t>
+              <a:t>28/12/2017</a:t>
             </a:fld>
             <a:endParaRPr lang="en-GB"/>
           </a:p>
@@ -732,7 +752,7 @@
           <a:lstStyle/>
           <a:p>
             <a:r>
-              <a:rPr lang="en-US" smtClean="0"/>
+              <a:rPr lang="en-US"/>
               <a:t>Click to edit Master title style</a:t>
             </a:r>
             <a:endParaRPr lang="en-GB"/>
@@ -756,35 +776,35 @@
           <a:p>
             <a:pPr lvl="0"/>
             <a:r>
-              <a:rPr lang="en-US" smtClean="0"/>
+              <a:rPr lang="en-US"/>
               <a:t>Click to edit Master text styles</a:t>
             </a:r>
           </a:p>
           <a:p>
             <a:pPr lvl="1"/>
             <a:r>
-              <a:rPr lang="en-US" smtClean="0"/>
+              <a:rPr lang="en-US"/>
               <a:t>Second level</a:t>
             </a:r>
           </a:p>
           <a:p>
             <a:pPr lvl="2"/>
             <a:r>
-              <a:rPr lang="en-US" smtClean="0"/>
+              <a:rPr lang="en-US"/>
               <a:t>Third level</a:t>
             </a:r>
           </a:p>
           <a:p>
             <a:pPr lvl="3"/>
             <a:r>
-              <a:rPr lang="en-US" smtClean="0"/>
+              <a:rPr lang="en-US"/>
               <a:t>Fourth level</a:t>
             </a:r>
           </a:p>
           <a:p>
             <a:pPr lvl="4"/>
             <a:r>
-              <a:rPr lang="en-US" smtClean="0"/>
+              <a:rPr lang="en-US"/>
               <a:t>Fifth level</a:t>
             </a:r>
             <a:endParaRPr lang="en-GB"/>
@@ -808,7 +828,7 @@
           <a:p>
             <a:fld id="{EA92691D-FF03-40D7-9ED0-9214EECCD472}" type="datetimeFigureOut">
               <a:rPr lang="en-GB" smtClean="0"/>
-              <a:t>14/03/2016</a:t>
+              <a:t>28/12/2017</a:t>
             </a:fld>
             <a:endParaRPr lang="en-GB"/>
           </a:p>
@@ -911,7 +931,7 @@
           </a:lstStyle>
           <a:p>
             <a:r>
-              <a:rPr lang="en-US" smtClean="0"/>
+              <a:rPr lang="en-US"/>
               <a:t>Click to edit Master title style</a:t>
             </a:r>
             <a:endParaRPr lang="en-GB"/>
@@ -1031,7 +1051,7 @@
           <a:p>
             <a:pPr lvl="0"/>
             <a:r>
-              <a:rPr lang="en-US" smtClean="0"/>
+              <a:rPr lang="en-US"/>
               <a:t>Click to edit Master text styles</a:t>
             </a:r>
           </a:p>
@@ -1054,7 +1074,7 @@
           <a:p>
             <a:fld id="{EA92691D-FF03-40D7-9ED0-9214EECCD472}" type="datetimeFigureOut">
               <a:rPr lang="en-GB" smtClean="0"/>
-              <a:t>14/03/2016</a:t>
+              <a:t>28/12/2017</a:t>
             </a:fld>
             <a:endParaRPr lang="en-GB"/>
           </a:p>
@@ -1148,7 +1168,7 @@
           <a:lstStyle/>
           <a:p>
             <a:r>
-              <a:rPr lang="en-US" smtClean="0"/>
+              <a:rPr lang="en-US"/>
               <a:t>Click to edit Master title style</a:t>
             </a:r>
             <a:endParaRPr lang="en-GB"/>
@@ -1205,35 +1225,35 @@
           <a:p>
             <a:pPr lvl="0"/>
             <a:r>
-              <a:rPr lang="en-US" smtClean="0"/>
+              <a:rPr lang="en-US"/>
               <a:t>Click to edit Master text styles</a:t>
             </a:r>
           </a:p>
           <a:p>
             <a:pPr lvl="1"/>
             <a:r>
-              <a:rPr lang="en-US" smtClean="0"/>
+              <a:rPr lang="en-US"/>
               <a:t>Second level</a:t>
             </a:r>
           </a:p>
           <a:p>
             <a:pPr lvl="2"/>
             <a:r>
-              <a:rPr lang="en-US" smtClean="0"/>
+              <a:rPr lang="en-US"/>
               <a:t>Third level</a:t>
             </a:r>
           </a:p>
           <a:p>
             <a:pPr lvl="3"/>
             <a:r>
-              <a:rPr lang="en-US" smtClean="0"/>
+              <a:rPr lang="en-US"/>
               <a:t>Fourth level</a:t>
             </a:r>
           </a:p>
           <a:p>
             <a:pPr lvl="4"/>
             <a:r>
-              <a:rPr lang="en-US" smtClean="0"/>
+              <a:rPr lang="en-US"/>
               <a:t>Fifth level</a:t>
             </a:r>
             <a:endParaRPr lang="en-GB"/>
@@ -1290,35 +1310,35 @@
           <a:p>
             <a:pPr lvl="0"/>
             <a:r>
-              <a:rPr lang="en-US" smtClean="0"/>
+              <a:rPr lang="en-US"/>
               <a:t>Click to edit Master text styles</a:t>
             </a:r>
           </a:p>
           <a:p>
             <a:pPr lvl="1"/>
             <a:r>
-              <a:rPr lang="en-US" smtClean="0"/>
+              <a:rPr lang="en-US"/>
               <a:t>Second level</a:t>
             </a:r>
           </a:p>
           <a:p>
             <a:pPr lvl="2"/>
             <a:r>
-              <a:rPr lang="en-US" smtClean="0"/>
+              <a:rPr lang="en-US"/>
               <a:t>Third level</a:t>
             </a:r>
           </a:p>
           <a:p>
             <a:pPr lvl="3"/>
             <a:r>
-              <a:rPr lang="en-US" smtClean="0"/>
+              <a:rPr lang="en-US"/>
               <a:t>Fourth level</a:t>
             </a:r>
           </a:p>
           <a:p>
             <a:pPr lvl="4"/>
             <a:r>
-              <a:rPr lang="en-US" smtClean="0"/>
+              <a:rPr lang="en-US"/>
               <a:t>Fifth level</a:t>
             </a:r>
             <a:endParaRPr lang="en-GB"/>
@@ -1342,7 +1362,7 @@
           <a:p>
             <a:fld id="{EA92691D-FF03-40D7-9ED0-9214EECCD472}" type="datetimeFigureOut">
               <a:rPr lang="en-GB" smtClean="0"/>
-              <a:t>14/03/2016</a:t>
+              <a:t>28/12/2017</a:t>
             </a:fld>
             <a:endParaRPr lang="en-GB"/>
           </a:p>
@@ -1440,7 +1460,7 @@
           </a:lstStyle>
           <a:p>
             <a:r>
-              <a:rPr lang="en-US" smtClean="0"/>
+              <a:rPr lang="en-US"/>
               <a:t>Click to edit Master title style</a:t>
             </a:r>
             <a:endParaRPr lang="en-GB"/>
@@ -1506,7 +1526,7 @@
           <a:p>
             <a:pPr lvl="0"/>
             <a:r>
-              <a:rPr lang="en-US" smtClean="0"/>
+              <a:rPr lang="en-US"/>
               <a:t>Click to edit Master text styles</a:t>
             </a:r>
           </a:p>
@@ -1562,35 +1582,35 @@
           <a:p>
             <a:pPr lvl="0"/>
             <a:r>
-              <a:rPr lang="en-US" smtClean="0"/>
+              <a:rPr lang="en-US"/>
               <a:t>Click to edit Master text styles</a:t>
             </a:r>
           </a:p>
           <a:p>
             <a:pPr lvl="1"/>
             <a:r>
-              <a:rPr lang="en-US" smtClean="0"/>
+              <a:rPr lang="en-US"/>
               <a:t>Second level</a:t>
             </a:r>
           </a:p>
           <a:p>
             <a:pPr lvl="2"/>
             <a:r>
-              <a:rPr lang="en-US" smtClean="0"/>
+              <a:rPr lang="en-US"/>
               <a:t>Third level</a:t>
             </a:r>
           </a:p>
           <a:p>
             <a:pPr lvl="3"/>
             <a:r>
-              <a:rPr lang="en-US" smtClean="0"/>
+              <a:rPr lang="en-US"/>
               <a:t>Fourth level</a:t>
             </a:r>
           </a:p>
           <a:p>
             <a:pPr lvl="4"/>
             <a:r>
-              <a:rPr lang="en-US" smtClean="0"/>
+              <a:rPr lang="en-US"/>
               <a:t>Fifth level</a:t>
             </a:r>
             <a:endParaRPr lang="en-GB"/>
@@ -1656,7 +1676,7 @@
           <a:p>
             <a:pPr lvl="0"/>
             <a:r>
-              <a:rPr lang="en-US" smtClean="0"/>
+              <a:rPr lang="en-US"/>
               <a:t>Click to edit Master text styles</a:t>
             </a:r>
           </a:p>
@@ -1712,35 +1732,35 @@
           <a:p>
             <a:pPr lvl="0"/>
             <a:r>
-              <a:rPr lang="en-US" smtClean="0"/>
+              <a:rPr lang="en-US"/>
               <a:t>Click to edit Master text styles</a:t>
             </a:r>
           </a:p>
           <a:p>
             <a:pPr lvl="1"/>
             <a:r>
-              <a:rPr lang="en-US" smtClean="0"/>
+              <a:rPr lang="en-US"/>
               <a:t>Second level</a:t>
             </a:r>
           </a:p>
           <a:p>
             <a:pPr lvl="2"/>
             <a:r>
-              <a:rPr lang="en-US" smtClean="0"/>
+              <a:rPr lang="en-US"/>
               <a:t>Third level</a:t>
             </a:r>
           </a:p>
           <a:p>
             <a:pPr lvl="3"/>
             <a:r>
-              <a:rPr lang="en-US" smtClean="0"/>
+              <a:rPr lang="en-US"/>
               <a:t>Fourth level</a:t>
             </a:r>
           </a:p>
           <a:p>
             <a:pPr lvl="4"/>
             <a:r>
-              <a:rPr lang="en-US" smtClean="0"/>
+              <a:rPr lang="en-US"/>
               <a:t>Fifth level</a:t>
             </a:r>
             <a:endParaRPr lang="en-GB"/>
@@ -1764,7 +1784,7 @@
           <a:p>
             <a:fld id="{EA92691D-FF03-40D7-9ED0-9214EECCD472}" type="datetimeFigureOut">
               <a:rPr lang="en-GB" smtClean="0"/>
-              <a:t>14/03/2016</a:t>
+              <a:t>28/12/2017</a:t>
             </a:fld>
             <a:endParaRPr lang="en-GB"/>
           </a:p>
@@ -1858,7 +1878,7 @@
           <a:lstStyle/>
           <a:p>
             <a:r>
-              <a:rPr lang="en-US" smtClean="0"/>
+              <a:rPr lang="en-US"/>
               <a:t>Click to edit Master title style</a:t>
             </a:r>
             <a:endParaRPr lang="en-GB"/>
@@ -1882,7 +1902,7 @@
           <a:p>
             <a:fld id="{EA92691D-FF03-40D7-9ED0-9214EECCD472}" type="datetimeFigureOut">
               <a:rPr lang="en-GB" smtClean="0"/>
-              <a:t>14/03/2016</a:t>
+              <a:t>28/12/2017</a:t>
             </a:fld>
             <a:endParaRPr lang="en-GB"/>
           </a:p>
@@ -1977,7 +1997,7 @@
           <a:p>
             <a:fld id="{EA92691D-FF03-40D7-9ED0-9214EECCD472}" type="datetimeFigureOut">
               <a:rPr lang="en-GB" smtClean="0"/>
-              <a:t>14/03/2016</a:t>
+              <a:t>28/12/2017</a:t>
             </a:fld>
             <a:endParaRPr lang="en-GB"/>
           </a:p>
@@ -2080,7 +2100,7 @@
           </a:lstStyle>
           <a:p>
             <a:r>
-              <a:rPr lang="en-US" smtClean="0"/>
+              <a:rPr lang="en-US"/>
               <a:t>Click to edit Master title style</a:t>
             </a:r>
             <a:endParaRPr lang="en-GB"/>
@@ -2137,35 +2157,35 @@
           <a:p>
             <a:pPr lvl="0"/>
             <a:r>
-              <a:rPr lang="en-US" smtClean="0"/>
+              <a:rPr lang="en-US"/>
               <a:t>Click to edit Master text styles</a:t>
             </a:r>
           </a:p>
           <a:p>
             <a:pPr lvl="1"/>
             <a:r>
-              <a:rPr lang="en-US" smtClean="0"/>
+              <a:rPr lang="en-US"/>
               <a:t>Second level</a:t>
             </a:r>
           </a:p>
           <a:p>
             <a:pPr lvl="2"/>
             <a:r>
-              <a:rPr lang="en-US" smtClean="0"/>
+              <a:rPr lang="en-US"/>
               <a:t>Third level</a:t>
             </a:r>
           </a:p>
           <a:p>
             <a:pPr lvl="3"/>
             <a:r>
-              <a:rPr lang="en-US" smtClean="0"/>
+              <a:rPr lang="en-US"/>
               <a:t>Fourth level</a:t>
             </a:r>
           </a:p>
           <a:p>
             <a:pPr lvl="4"/>
             <a:r>
-              <a:rPr lang="en-US" smtClean="0"/>
+              <a:rPr lang="en-US"/>
               <a:t>Fifth level</a:t>
             </a:r>
             <a:endParaRPr lang="en-GB"/>
@@ -2231,7 +2251,7 @@
           <a:p>
             <a:pPr lvl="0"/>
             <a:r>
-              <a:rPr lang="en-US" smtClean="0"/>
+              <a:rPr lang="en-US"/>
               <a:t>Click to edit Master text styles</a:t>
             </a:r>
           </a:p>
@@ -2254,7 +2274,7 @@
           <a:p>
             <a:fld id="{EA92691D-FF03-40D7-9ED0-9214EECCD472}" type="datetimeFigureOut">
               <a:rPr lang="en-GB" smtClean="0"/>
-              <a:t>14/03/2016</a:t>
+              <a:t>28/12/2017</a:t>
             </a:fld>
             <a:endParaRPr lang="en-GB"/>
           </a:p>
@@ -2357,7 +2377,7 @@
           </a:lstStyle>
           <a:p>
             <a:r>
-              <a:rPr lang="en-US" smtClean="0"/>
+              <a:rPr lang="en-US"/>
               <a:t>Click to edit Master title style</a:t>
             </a:r>
             <a:endParaRPr lang="en-GB"/>
@@ -2484,7 +2504,7 @@
           <a:p>
             <a:pPr lvl="0"/>
             <a:r>
-              <a:rPr lang="en-US" smtClean="0"/>
+              <a:rPr lang="en-US"/>
               <a:t>Click to edit Master text styles</a:t>
             </a:r>
           </a:p>
@@ -2507,7 +2527,7 @@
           <a:p>
             <a:fld id="{EA92691D-FF03-40D7-9ED0-9214EECCD472}" type="datetimeFigureOut">
               <a:rPr lang="en-GB" smtClean="0"/>
-              <a:t>14/03/2016</a:t>
+              <a:t>28/12/2017</a:t>
             </a:fld>
             <a:endParaRPr lang="en-GB"/>
           </a:p>
@@ -2616,7 +2636,7 @@
           <a:lstStyle/>
           <a:p>
             <a:r>
-              <a:rPr lang="en-US" smtClean="0"/>
+              <a:rPr lang="en-US"/>
               <a:t>Click to edit Master title style</a:t>
             </a:r>
             <a:endParaRPr lang="en-GB"/>
@@ -2650,35 +2670,35 @@
           <a:p>
             <a:pPr lvl="0"/>
             <a:r>
-              <a:rPr lang="en-US" smtClean="0"/>
+              <a:rPr lang="en-US"/>
               <a:t>Click to edit Master text styles</a:t>
             </a:r>
           </a:p>
           <a:p>
             <a:pPr lvl="1"/>
             <a:r>
-              <a:rPr lang="en-US" smtClean="0"/>
+              <a:rPr lang="en-US"/>
               <a:t>Second level</a:t>
             </a:r>
           </a:p>
           <a:p>
             <a:pPr lvl="2"/>
             <a:r>
-              <a:rPr lang="en-US" smtClean="0"/>
+              <a:rPr lang="en-US"/>
               <a:t>Third level</a:t>
             </a:r>
           </a:p>
           <a:p>
             <a:pPr lvl="3"/>
             <a:r>
-              <a:rPr lang="en-US" smtClean="0"/>
+              <a:rPr lang="en-US"/>
               <a:t>Fourth level</a:t>
             </a:r>
           </a:p>
           <a:p>
             <a:pPr lvl="4"/>
             <a:r>
-              <a:rPr lang="en-US" smtClean="0"/>
+              <a:rPr lang="en-US"/>
               <a:t>Fifth level</a:t>
             </a:r>
             <a:endParaRPr lang="en-GB"/>
@@ -2720,7 +2740,7 @@
           <a:p>
             <a:fld id="{EA92691D-FF03-40D7-9ED0-9214EECCD472}" type="datetimeFigureOut">
               <a:rPr lang="en-GB" smtClean="0"/>
-              <a:t>14/03/2016</a:t>
+              <a:t>28/12/2017</a:t>
             </a:fld>
             <a:endParaRPr lang="en-GB"/>
           </a:p>
@@ -3131,18 +3151,13 @@
           <a:lstStyle/>
           <a:p>
             <a:r>
-              <a:rPr lang="en-GB" i="1" dirty="0" smtClean="0">
+              <a:rPr lang="en-GB" i="1" dirty="0">
                 <a:solidFill>
                   <a:schemeClr val="tx1"/>
                 </a:solidFill>
               </a:rPr>
               <a:t>Called by framework</a:t>
             </a:r>
-            <a:endParaRPr lang="en-GB" i="1" dirty="0">
-              <a:solidFill>
-                <a:schemeClr val="tx1"/>
-              </a:solidFill>
-            </a:endParaRPr>
           </a:p>
         </p:txBody>
       </p:sp>
@@ -3154,8 +3169,8 @@
         </p:nvSpPr>
         <p:spPr>
           <a:xfrm>
-            <a:off x="2379506" y="404664"/>
-            <a:ext cx="5216830" cy="2952328"/>
+            <a:off x="723322" y="404664"/>
+            <a:ext cx="6873014" cy="2952328"/>
           </a:xfrm>
           <a:prstGeom prst="rect">
             <a:avLst/>
@@ -3182,18 +3197,13 @@
           <a:lstStyle/>
           <a:p>
             <a:r>
-              <a:rPr lang="en-GB" i="1" dirty="0" smtClean="0">
+              <a:rPr lang="en-GB" i="1" dirty="0">
                 <a:solidFill>
                   <a:schemeClr val="tx1"/>
                 </a:solidFill>
               </a:rPr>
               <a:t>Called by domain objects</a:t>
             </a:r>
-            <a:endParaRPr lang="en-GB" i="1" dirty="0">
-              <a:solidFill>
-                <a:schemeClr val="tx1"/>
-              </a:solidFill>
-            </a:endParaRPr>
           </a:p>
         </p:txBody>
       </p:sp>
@@ -3234,24 +3244,23 @@
           <a:p>
             <a:pPr algn="ctr"/>
             <a:r>
-              <a:rPr lang="en-GB" dirty="0" smtClean="0"/>
+              <a:rPr lang="en-GB" dirty="0"/>
               <a:t>Presentation</a:t>
             </a:r>
             <a:br>
-              <a:rPr lang="en-GB" dirty="0" smtClean="0"/>
+              <a:rPr lang="en-GB" dirty="0"/>
             </a:br>
             <a:r>
-              <a:rPr lang="en-GB" dirty="0" smtClean="0"/>
+              <a:rPr lang="en-GB" dirty="0"/>
               <a:t>Layer</a:t>
             </a:r>
           </a:p>
           <a:p>
             <a:pPr algn="ctr"/>
             <a:r>
-              <a:rPr lang="en-GB" dirty="0" smtClean="0"/>
+              <a:rPr lang="en-GB" dirty="0"/>
               <a:t>SPI</a:t>
             </a:r>
-            <a:endParaRPr lang="en-GB" dirty="0"/>
           </a:p>
         </p:txBody>
       </p:sp>
@@ -3292,25 +3301,23 @@
           <a:p>
             <a:pPr algn="ctr"/>
             <a:r>
-              <a:rPr lang="en-GB" dirty="0" smtClean="0"/>
+              <a:rPr lang="en-GB" dirty="0"/>
               <a:t>Application</a:t>
             </a:r>
             <a:br>
-              <a:rPr lang="en-GB" dirty="0" smtClean="0"/>
+              <a:rPr lang="en-GB" dirty="0"/>
             </a:br>
             <a:r>
-              <a:rPr lang="en-GB" dirty="0" smtClean="0"/>
+              <a:rPr lang="en-GB" dirty="0"/>
               <a:t>Layer</a:t>
             </a:r>
-            <a:endParaRPr lang="en-GB" dirty="0"/>
           </a:p>
           <a:p>
             <a:pPr algn="ctr"/>
             <a:r>
-              <a:rPr lang="en-GB" dirty="0" smtClean="0"/>
+              <a:rPr lang="en-GB" dirty="0"/>
               <a:t>API</a:t>
             </a:r>
-            <a:endParaRPr lang="en-GB" dirty="0"/>
           </a:p>
         </p:txBody>
       </p:sp>
@@ -3351,17 +3358,16 @@
           <a:p>
             <a:pPr algn="ctr"/>
             <a:r>
-              <a:rPr lang="en-GB" dirty="0" smtClean="0"/>
+              <a:rPr lang="en-GB" dirty="0"/>
               <a:t>Core/Domain</a:t>
             </a:r>
           </a:p>
           <a:p>
             <a:pPr algn="ctr"/>
             <a:r>
-              <a:rPr lang="en-GB" dirty="0" smtClean="0"/>
+              <a:rPr lang="en-GB" dirty="0"/>
               <a:t>API</a:t>
             </a:r>
-            <a:endParaRPr lang="en-GB" dirty="0"/>
           </a:p>
         </p:txBody>
       </p:sp>
@@ -3402,24 +3408,23 @@
           <a:p>
             <a:pPr algn="ctr"/>
             <a:r>
-              <a:rPr lang="en-GB" dirty="0" smtClean="0"/>
+              <a:rPr lang="en-GB" dirty="0"/>
               <a:t>Persistence</a:t>
             </a:r>
             <a:br>
-              <a:rPr lang="en-GB" dirty="0" smtClean="0"/>
+              <a:rPr lang="en-GB" dirty="0"/>
             </a:br>
             <a:r>
-              <a:rPr lang="en-GB" dirty="0" smtClean="0"/>
+              <a:rPr lang="en-GB" dirty="0"/>
               <a:t>Layer</a:t>
             </a:r>
           </a:p>
           <a:p>
             <a:pPr algn="ctr"/>
             <a:r>
-              <a:rPr lang="en-GB" dirty="0" smtClean="0"/>
+              <a:rPr lang="en-GB" dirty="0"/>
               <a:t>API</a:t>
             </a:r>
-            <a:endParaRPr lang="en-GB" dirty="0"/>
           </a:p>
         </p:txBody>
       </p:sp>
@@ -3460,17 +3465,16 @@
           <a:p>
             <a:pPr algn="ctr"/>
             <a:r>
-              <a:rPr lang="en-GB" dirty="0" smtClean="0"/>
+              <a:rPr lang="en-GB" dirty="0"/>
               <a:t>Integration</a:t>
             </a:r>
             <a:br>
-              <a:rPr lang="en-GB" dirty="0" smtClean="0"/>
+              <a:rPr lang="en-GB" dirty="0"/>
             </a:br>
             <a:r>
-              <a:rPr lang="en-GB" dirty="0" smtClean="0"/>
+              <a:rPr lang="en-GB" dirty="0"/>
               <a:t>API</a:t>
             </a:r>
-            <a:endParaRPr lang="en-GB" dirty="0"/>
           </a:p>
         </p:txBody>
       </p:sp>
@@ -3511,17 +3515,16 @@
           <a:p>
             <a:pPr algn="ctr"/>
             <a:r>
-              <a:rPr lang="en-GB" dirty="0" smtClean="0"/>
+              <a:rPr lang="en-GB" dirty="0"/>
               <a:t>Persistence Layer</a:t>
             </a:r>
           </a:p>
           <a:p>
             <a:pPr algn="ctr"/>
             <a:r>
-              <a:rPr lang="en-GB" dirty="0" smtClean="0"/>
+              <a:rPr lang="en-GB" dirty="0"/>
               <a:t>SPI</a:t>
             </a:r>
-            <a:endParaRPr lang="en-GB" dirty="0"/>
           </a:p>
         </p:txBody>
       </p:sp>
@@ -3563,7 +3566,6 @@
               <a:rPr lang="en-GB" dirty="0"/>
               <a:t>Testing</a:t>
             </a:r>
-            <a:endParaRPr lang="en-GB" dirty="0"/>
           </a:p>
         </p:txBody>
       </p:sp>
@@ -3604,17 +3606,16 @@
           <a:p>
             <a:pPr algn="ctr"/>
             <a:r>
-              <a:rPr lang="en-GB" dirty="0" smtClean="0"/>
+              <a:rPr lang="en-GB" dirty="0"/>
               <a:t>Metadata</a:t>
             </a:r>
             <a:br>
-              <a:rPr lang="en-GB" dirty="0" smtClean="0"/>
+              <a:rPr lang="en-GB" dirty="0"/>
             </a:br>
             <a:r>
-              <a:rPr lang="en-GB" dirty="0" smtClean="0"/>
+              <a:rPr lang="en-GB" dirty="0"/>
               <a:t>API</a:t>
             </a:r>
-            <a:endParaRPr lang="en-GB" dirty="0"/>
           </a:p>
         </p:txBody>
       </p:sp>
@@ -3655,24 +3656,23 @@
           <a:p>
             <a:pPr algn="ctr"/>
             <a:r>
-              <a:rPr lang="en-GB" dirty="0" smtClean="0"/>
+              <a:rPr lang="en-GB" dirty="0"/>
               <a:t>Application</a:t>
             </a:r>
             <a:br>
-              <a:rPr lang="en-GB" dirty="0" smtClean="0"/>
+              <a:rPr lang="en-GB" dirty="0"/>
             </a:br>
             <a:r>
-              <a:rPr lang="en-GB" dirty="0" smtClean="0"/>
+              <a:rPr lang="en-GB" dirty="0"/>
               <a:t>Layer</a:t>
             </a:r>
           </a:p>
           <a:p>
             <a:pPr algn="ctr"/>
             <a:r>
-              <a:rPr lang="en-GB" dirty="0" smtClean="0"/>
+              <a:rPr lang="en-GB" dirty="0"/>
               <a:t>SPI</a:t>
             </a:r>
-            <a:endParaRPr lang="en-GB" dirty="0"/>
           </a:p>
         </p:txBody>
       </p:sp>
@@ -3711,10 +3711,72 @@
           <a:p>
             <a:pPr algn="ctr"/>
             <a:r>
-              <a:rPr lang="en-GB" dirty="0" smtClean="0"/>
+              <a:rPr lang="en-GB" dirty="0"/>
               <a:t>Bootstrapping SPI</a:t>
             </a:r>
-            <a:endParaRPr lang="en-GB" dirty="0"/>
+          </a:p>
+        </p:txBody>
+      </p:sp>
+      <p:sp>
+        <p:nvSpPr>
+          <p:cNvPr id="15" name="Rectangle 14">
+            <a:extLst>
+              <a:ext uri="{FF2B5EF4-FFF2-40B4-BE49-F238E27FC236}">
+                <a16:creationId xmlns:a16="http://schemas.microsoft.com/office/drawing/2014/main" id="{D0085A4A-226D-4DFD-8B85-CC910B9AF9AF}"/>
+              </a:ext>
+            </a:extLst>
+          </p:cNvPr>
+          <p:cNvSpPr/>
+          <p:nvPr/>
+        </p:nvSpPr>
+        <p:spPr>
+          <a:xfrm>
+            <a:off x="939346" y="2060848"/>
+            <a:ext cx="1512168" cy="1078865"/>
+          </a:xfrm>
+          <a:prstGeom prst="rect">
+            <a:avLst/>
+          </a:prstGeom>
+        </p:spPr>
+        <p:style>
+          <a:lnRef idx="2">
+            <a:schemeClr val="accent5">
+              <a:shade val="50000"/>
+            </a:schemeClr>
+          </a:lnRef>
+          <a:fillRef idx="1">
+            <a:schemeClr val="accent5"/>
+          </a:fillRef>
+          <a:effectRef idx="0">
+            <a:schemeClr val="accent5"/>
+          </a:effectRef>
+          <a:fontRef idx="minor">
+            <a:schemeClr val="lt1"/>
+          </a:fontRef>
+        </p:style>
+        <p:txBody>
+          <a:bodyPr rtlCol="0" anchor="ctr"/>
+          <a:lstStyle/>
+          <a:p>
+            <a:pPr algn="ctr"/>
+            <a:r>
+              <a:rPr lang="en-GB" dirty="0"/>
+              <a:t>Presentation</a:t>
+            </a:r>
+            <a:br>
+              <a:rPr lang="en-GB" dirty="0"/>
+            </a:br>
+            <a:r>
+              <a:rPr lang="en-GB" dirty="0"/>
+              <a:t>Layer</a:t>
+            </a:r>
+          </a:p>
+          <a:p>
+            <a:pPr algn="ctr"/>
+            <a:r>
+              <a:rPr lang="en-GB" dirty="0"/>
+              <a:t>API</a:t>
+            </a:r>
           </a:p>
         </p:txBody>
       </p:sp>

</xml_diff>